<commit_message>
added final commenting for some of the code and reorganised the folders
</commit_message>
<xml_diff>
--- a/meetings/week 16 Meeting.pptx
+++ b/meetings/week 16 Meeting.pptx
@@ -122,14 +122,6 @@
     </p:ext>
   </p:extLst>
 </p:presentation>
-</file>
-
-<file path=ppt/revisionInfo.xml><?xml version="1.0" encoding="utf-8"?>
-<p1510:revInfo xmlns:a="http://schemas.openxmlformats.org/drawingml/2006/main" xmlns:r="http://schemas.openxmlformats.org/officeDocument/2006/relationships" xmlns:p1510="http://schemas.microsoft.com/office/powerpoint/2015/10/main">
-  <p1510:revLst>
-    <p1510:client id="{88414CC6-2580-41B3-94A9-3D9A674B20A3}" v="10" dt="2022-02-07T11:09:43.860"/>
-  </p1510:revLst>
-</p1510:revInfo>
 </file>
 
 <file path=ppt/changesInfos/changesInfo1.xml><?xml version="1.0" encoding="utf-8"?>
@@ -738,6 +730,30 @@
       </pc:sldChg>
     </pc:docChg>
   </pc:docChgLst>
+  <pc:docChgLst>
+    <pc:chgData name="toby lee" userId="c2b0b406bfa6151f" providerId="LiveId" clId="{82B7BD4A-E560-4C04-945A-8573B3AED833}"/>
+    <pc:docChg chg="modSld">
+      <pc:chgData name="toby lee" userId="c2b0b406bfa6151f" providerId="LiveId" clId="{82B7BD4A-E560-4C04-945A-8573B3AED833}" dt="2022-04-08T03:38:36.657" v="10" actId="20577"/>
+      <pc:docMkLst>
+        <pc:docMk/>
+      </pc:docMkLst>
+      <pc:sldChg chg="modSp mod">
+        <pc:chgData name="toby lee" userId="c2b0b406bfa6151f" providerId="LiveId" clId="{82B7BD4A-E560-4C04-945A-8573B3AED833}" dt="2022-04-08T03:38:36.657" v="10" actId="20577"/>
+        <pc:sldMkLst>
+          <pc:docMk/>
+          <pc:sldMk cId="3956411206" sldId="256"/>
+        </pc:sldMkLst>
+        <pc:spChg chg="mod">
+          <ac:chgData name="toby lee" userId="c2b0b406bfa6151f" providerId="LiveId" clId="{82B7BD4A-E560-4C04-945A-8573B3AED833}" dt="2022-04-08T03:38:36.657" v="10" actId="20577"/>
+          <ac:spMkLst>
+            <pc:docMk/>
+            <pc:sldMk cId="3956411206" sldId="256"/>
+            <ac:spMk id="3" creationId="{29796D7D-3175-4BB8-9B63-55C81B20C750}"/>
+          </ac:spMkLst>
+        </pc:spChg>
+      </pc:sldChg>
+    </pc:docChg>
+  </pc:docChgLst>
 </pc:chgInfo>
 </file>
 
@@ -979,7 +995,7 @@
           <a:p>
             <a:fld id="{ED291B17-9318-49DB-B28B-6E5994AE9581}" type="datetime1">
               <a:rPr lang="en-US" smtClean="0"/>
-              <a:t>2/7/2022</a:t>
+              <a:t>4/8/2022</a:t>
             </a:fld>
             <a:endParaRPr lang="en-US" dirty="0"/>
           </a:p>
@@ -1182,7 +1198,7 @@
           <a:p>
             <a:fld id="{2CED4963-E985-44C4-B8C4-FDD613B7C2F8}" type="datetime1">
               <a:rPr lang="en-US" smtClean="0"/>
-              <a:t>2/7/2022</a:t>
+              <a:t>4/8/2022</a:t>
             </a:fld>
             <a:endParaRPr lang="en-US" dirty="0"/>
           </a:p>
@@ -1544,7 +1560,7 @@
           <a:p>
             <a:fld id="{ED291B17-9318-49DB-B28B-6E5994AE9581}" type="datetime1">
               <a:rPr lang="en-US" smtClean="0"/>
-              <a:t>2/7/2022</a:t>
+              <a:t>4/8/2022</a:t>
             </a:fld>
             <a:endParaRPr lang="en-US" dirty="0"/>
           </a:p>
@@ -1742,7 +1758,7 @@
           <a:p>
             <a:fld id="{78DD82B9-B8EE-4375-B6FF-88FA6ABB15D9}" type="datetime1">
               <a:rPr lang="en-US" smtClean="0"/>
-              <a:t>2/7/2022</a:t>
+              <a:t>4/8/2022</a:t>
             </a:fld>
             <a:endParaRPr lang="en-US" dirty="0"/>
           </a:p>
@@ -2054,7 +2070,7 @@
           <a:p>
             <a:fld id="{B2497495-0637-405E-AE64-5CC7506D51F5}" type="datetime1">
               <a:rPr lang="en-US" smtClean="0"/>
-              <a:t>2/7/2022</a:t>
+              <a:t>4/8/2022</a:t>
             </a:fld>
             <a:endParaRPr lang="en-US" dirty="0"/>
           </a:p>
@@ -2307,7 +2323,7 @@
           <a:p>
             <a:fld id="{7BFFD690-9426-415D-8B65-26881E07B2D4}" type="datetime1">
               <a:rPr lang="en-US" smtClean="0"/>
-              <a:t>2/7/2022</a:t>
+              <a:t>4/8/2022</a:t>
             </a:fld>
             <a:endParaRPr lang="en-US" dirty="0"/>
           </a:p>
@@ -2729,7 +2745,7 @@
           <a:p>
             <a:fld id="{04C4989A-474C-40DE-95B9-011C28B71673}" type="datetime1">
               <a:rPr lang="en-US" smtClean="0"/>
-              <a:t>2/7/2022</a:t>
+              <a:t>4/8/2022</a:t>
             </a:fld>
             <a:endParaRPr lang="en-US" dirty="0"/>
           </a:p>
@@ -2852,7 +2868,7 @@
           <a:p>
             <a:fld id="{5DB4ED54-5B5E-4A04-93D3-5772E3CE3818}" type="datetime1">
               <a:rPr lang="en-US" smtClean="0"/>
-              <a:t>2/7/2022</a:t>
+              <a:t>4/8/2022</a:t>
             </a:fld>
             <a:endParaRPr lang="en-US" dirty="0"/>
           </a:p>
@@ -2947,7 +2963,7 @@
           <a:p>
             <a:fld id="{4EDE50D6-574B-40AF-946F-D52A04ADE379}" type="datetime1">
               <a:rPr lang="en-US" smtClean="0"/>
-              <a:t>2/7/2022</a:t>
+              <a:t>4/8/2022</a:t>
             </a:fld>
             <a:endParaRPr lang="en-US" dirty="0"/>
           </a:p>
@@ -3324,7 +3340,7 @@
           <a:p>
             <a:fld id="{D82884F1-FFEA-405F-9602-3DCA865EDA4E}" type="datetime1">
               <a:rPr lang="en-US" smtClean="0"/>
-              <a:t>2/7/2022</a:t>
+              <a:t>4/8/2022</a:t>
             </a:fld>
             <a:endParaRPr lang="en-US" dirty="0"/>
           </a:p>
@@ -3617,7 +3633,7 @@
           <a:p>
             <a:fld id="{7E18DB4A-8810-4A10-AD5C-D5E2C667F5B3}" type="datetime1">
               <a:rPr lang="en-US" smtClean="0"/>
-              <a:t>2/7/2022</a:t>
+              <a:t>4/8/2022</a:t>
             </a:fld>
             <a:endParaRPr lang="en-US" dirty="0"/>
           </a:p>
@@ -3832,7 +3848,7 @@
           <a:p>
             <a:fld id="{ED291B17-9318-49DB-B28B-6E5994AE9581}" type="datetime1">
               <a:rPr lang="en-US" smtClean="0"/>
-              <a:t>2/7/2022</a:t>
+              <a:t>4/8/2022</a:t>
             </a:fld>
             <a:endParaRPr lang="en-US" dirty="0"/>
           </a:p>
@@ -4753,7 +4769,7 @@
           <a:p>
             <a:r>
               <a:rPr lang="en-GB" dirty="0"/>
-              <a:t>Week 14 Meeting, 31/1/2021</a:t>
+              <a:t>Week 15 Meeting, 6/2/2021</a:t>
             </a:r>
             <a:endParaRPr lang="en-US" dirty="0"/>
           </a:p>

</xml_diff>